<commit_message>
Add combined map, summary stats, and time series for BAMS article
</commit_message>
<xml_diff>
--- a/maps/figure_planning.pptx
+++ b/maps/figure_planning.pptx
@@ -214,7 +214,7 @@
           <a:p>
             <a:fld id="{422F3072-322A-DA4D-AC6E-0CD1ACFAE444}" type="datetimeFigureOut">
               <a:rPr lang="en-US" smtClean="0"/>
-              <a:t>1/22/25</a:t>
+              <a:t>2/5/25</a:t>
             </a:fld>
             <a:endParaRPr lang="en-US"/>
           </a:p>
@@ -701,7 +701,7 @@
           <a:p>
             <a:fld id="{019DE3D8-0983-BC45-A5A7-54FDFD4AAD37}" type="datetimeFigureOut">
               <a:rPr lang="en-US" smtClean="0"/>
-              <a:t>1/22/25</a:t>
+              <a:t>2/5/25</a:t>
             </a:fld>
             <a:endParaRPr lang="en-US"/>
           </a:p>
@@ -871,7 +871,7 @@
           <a:p>
             <a:fld id="{019DE3D8-0983-BC45-A5A7-54FDFD4AAD37}" type="datetimeFigureOut">
               <a:rPr lang="en-US" smtClean="0"/>
-              <a:t>1/22/25</a:t>
+              <a:t>2/5/25</a:t>
             </a:fld>
             <a:endParaRPr lang="en-US"/>
           </a:p>
@@ -1051,7 +1051,7 @@
           <a:p>
             <a:fld id="{019DE3D8-0983-BC45-A5A7-54FDFD4AAD37}" type="datetimeFigureOut">
               <a:rPr lang="en-US" smtClean="0"/>
-              <a:t>1/22/25</a:t>
+              <a:t>2/5/25</a:t>
             </a:fld>
             <a:endParaRPr lang="en-US"/>
           </a:p>
@@ -1221,7 +1221,7 @@
           <a:p>
             <a:fld id="{019DE3D8-0983-BC45-A5A7-54FDFD4AAD37}" type="datetimeFigureOut">
               <a:rPr lang="en-US" smtClean="0"/>
-              <a:t>1/22/25</a:t>
+              <a:t>2/5/25</a:t>
             </a:fld>
             <a:endParaRPr lang="en-US"/>
           </a:p>
@@ -1467,7 +1467,7 @@
           <a:p>
             <a:fld id="{019DE3D8-0983-BC45-A5A7-54FDFD4AAD37}" type="datetimeFigureOut">
               <a:rPr lang="en-US" smtClean="0"/>
-              <a:t>1/22/25</a:t>
+              <a:t>2/5/25</a:t>
             </a:fld>
             <a:endParaRPr lang="en-US"/>
           </a:p>
@@ -1699,7 +1699,7 @@
           <a:p>
             <a:fld id="{019DE3D8-0983-BC45-A5A7-54FDFD4AAD37}" type="datetimeFigureOut">
               <a:rPr lang="en-US" smtClean="0"/>
-              <a:t>1/22/25</a:t>
+              <a:t>2/5/25</a:t>
             </a:fld>
             <a:endParaRPr lang="en-US"/>
           </a:p>
@@ -2066,7 +2066,7 @@
           <a:p>
             <a:fld id="{019DE3D8-0983-BC45-A5A7-54FDFD4AAD37}" type="datetimeFigureOut">
               <a:rPr lang="en-US" smtClean="0"/>
-              <a:t>1/22/25</a:t>
+              <a:t>2/5/25</a:t>
             </a:fld>
             <a:endParaRPr lang="en-US"/>
           </a:p>
@@ -2184,7 +2184,7 @@
           <a:p>
             <a:fld id="{019DE3D8-0983-BC45-A5A7-54FDFD4AAD37}" type="datetimeFigureOut">
               <a:rPr lang="en-US" smtClean="0"/>
-              <a:t>1/22/25</a:t>
+              <a:t>2/5/25</a:t>
             </a:fld>
             <a:endParaRPr lang="en-US"/>
           </a:p>
@@ -2279,7 +2279,7 @@
           <a:p>
             <a:fld id="{019DE3D8-0983-BC45-A5A7-54FDFD4AAD37}" type="datetimeFigureOut">
               <a:rPr lang="en-US" smtClean="0"/>
-              <a:t>1/22/25</a:t>
+              <a:t>2/5/25</a:t>
             </a:fld>
             <a:endParaRPr lang="en-US"/>
           </a:p>
@@ -2556,7 +2556,7 @@
           <a:p>
             <a:fld id="{019DE3D8-0983-BC45-A5A7-54FDFD4AAD37}" type="datetimeFigureOut">
               <a:rPr lang="en-US" smtClean="0"/>
-              <a:t>1/22/25</a:t>
+              <a:t>2/5/25</a:t>
             </a:fld>
             <a:endParaRPr lang="en-US"/>
           </a:p>
@@ -2813,7 +2813,7 @@
           <a:p>
             <a:fld id="{019DE3D8-0983-BC45-A5A7-54FDFD4AAD37}" type="datetimeFigureOut">
               <a:rPr lang="en-US" smtClean="0"/>
-              <a:t>1/22/25</a:t>
+              <a:t>2/5/25</a:t>
             </a:fld>
             <a:endParaRPr lang="en-US"/>
           </a:p>
@@ -3026,7 +3026,7 @@
           <a:p>
             <a:fld id="{019DE3D8-0983-BC45-A5A7-54FDFD4AAD37}" type="datetimeFigureOut">
               <a:rPr lang="en-US" smtClean="0"/>
-              <a:t>1/22/25</a:t>
+              <a:t>2/5/25</a:t>
             </a:fld>
             <a:endParaRPr lang="en-US"/>
           </a:p>
@@ -3791,9 +3791,6 @@
               </a:rPr>
               <a:t>Idalia (2023)</a:t>
             </a:r>
-            <a:endParaRPr lang="en-US" dirty="0">
-              <a:latin typeface="Helvetica Light" panose="020B0403020202020204" pitchFamily="34" charset="0"/>
-            </a:endParaRPr>
           </a:p>
         </p:txBody>
       </p:sp>
@@ -3832,9 +3829,6 @@
               </a:rPr>
               <a:t>Lee (2023)</a:t>
             </a:r>
-            <a:endParaRPr lang="en-US" dirty="0">
-              <a:latin typeface="Helvetica Light" panose="020B0403020202020204" pitchFamily="34" charset="0"/>
-            </a:endParaRPr>
           </a:p>
         </p:txBody>
       </p:sp>
@@ -3873,9 +3867,6 @@
               </a:rPr>
               <a:t>Francine (2024)</a:t>
             </a:r>
-            <a:endParaRPr lang="en-US" dirty="0">
-              <a:latin typeface="Helvetica Light" panose="020B0403020202020204" pitchFamily="34" charset="0"/>
-            </a:endParaRPr>
           </a:p>
         </p:txBody>
       </p:sp>
@@ -3914,9 +3905,6 @@
               </a:rPr>
               <a:t>Helene (2024)</a:t>
             </a:r>
-            <a:endParaRPr lang="en-US" dirty="0">
-              <a:latin typeface="Helvetica Light" panose="020B0403020202020204" pitchFamily="34" charset="0"/>
-            </a:endParaRPr>
           </a:p>
         </p:txBody>
       </p:sp>
@@ -3955,9 +3943,6 @@
               </a:rPr>
               <a:t>Milton (2024)</a:t>
             </a:r>
-            <a:endParaRPr lang="en-US" dirty="0">
-              <a:latin typeface="Helvetica Light" panose="020B0403020202020204" pitchFamily="34" charset="0"/>
-            </a:endParaRPr>
           </a:p>
         </p:txBody>
       </p:sp>
@@ -3976,7 +3961,7 @@
         <p:spPr>
           <a:xfrm>
             <a:off x="1719303" y="14780708"/>
-            <a:ext cx="4343399" cy="646331"/>
+            <a:ext cx="4343399" cy="2308324"/>
           </a:xfrm>
           <a:prstGeom prst="rect">
             <a:avLst/>
@@ -4007,7 +3992,162 @@
                 </a:solidFill>
                 <a:latin typeface="Helvetica" pitchFamily="2" charset="0"/>
               </a:rPr>
-              <a:t>	- Need to make Lee a square aspect</a:t>
+              <a:t>- Add Jenna’s points</a:t>
+            </a:r>
+          </a:p>
+          <a:p>
+            <a:r>
+              <a:rPr lang="en-US" dirty="0">
+                <a:solidFill>
+                  <a:srgbClr val="FF0000"/>
+                </a:solidFill>
+                <a:latin typeface="Helvetica" pitchFamily="2" charset="0"/>
+              </a:rPr>
+              <a:t>- Bathymetry? (similar to paper)</a:t>
+            </a:r>
+          </a:p>
+          <a:p>
+            <a:r>
+              <a:rPr lang="en-US" dirty="0">
+                <a:solidFill>
+                  <a:srgbClr val="FF0000"/>
+                </a:solidFill>
+                <a:latin typeface="Helvetica" pitchFamily="2" charset="0"/>
+              </a:rPr>
+              <a:t>- Need to make Lee a square aspect</a:t>
+            </a:r>
+          </a:p>
+          <a:p>
+            <a:r>
+              <a:rPr lang="en-US" dirty="0">
+                <a:solidFill>
+                  <a:srgbClr val="FF0000"/>
+                </a:solidFill>
+                <a:latin typeface="Helvetica" pitchFamily="2" charset="0"/>
+              </a:rPr>
+              <a:t>- Set same scales across all (same latitude)</a:t>
+            </a:r>
+          </a:p>
+          <a:p>
+            <a:r>
+              <a:rPr lang="en-US" dirty="0">
+                <a:solidFill>
+                  <a:srgbClr val="FF0000"/>
+                </a:solidFill>
+                <a:latin typeface="Helvetica" pitchFamily="2" charset="0"/>
+              </a:rPr>
+              <a:t>- Add scale bar?</a:t>
+            </a:r>
+          </a:p>
+          <a:p>
+            <a:endParaRPr lang="en-US" dirty="0">
+              <a:solidFill>
+                <a:srgbClr val="FF0000"/>
+              </a:solidFill>
+              <a:latin typeface="Helvetica" pitchFamily="2" charset="0"/>
+            </a:endParaRPr>
+          </a:p>
+        </p:txBody>
+      </p:sp>
+      <p:sp>
+        <p:nvSpPr>
+          <p:cNvPr id="2" name="TextBox 1">
+            <a:extLst>
+              <a:ext uri="{FF2B5EF4-FFF2-40B4-BE49-F238E27FC236}">
+                <a16:creationId xmlns:a16="http://schemas.microsoft.com/office/drawing/2014/main" id="{16E2B135-8FD6-5B6C-D511-B364D506EAB0}"/>
+              </a:ext>
+            </a:extLst>
+          </p:cNvPr>
+          <p:cNvSpPr txBox="1"/>
+          <p:nvPr/>
+        </p:nvSpPr>
+        <p:spPr>
+          <a:xfrm>
+            <a:off x="4018613" y="12165613"/>
+            <a:ext cx="7727511" cy="1200329"/>
+          </a:xfrm>
+          <a:prstGeom prst="rect">
+            <a:avLst/>
+          </a:prstGeom>
+          <a:noFill/>
+        </p:spPr>
+        <p:txBody>
+          <a:bodyPr wrap="square" rtlCol="0">
+            <a:spAutoFit/>
+          </a:bodyPr>
+          <a:lstStyle/>
+          <a:p>
+            <a:r>
+              <a:rPr lang="en-US" dirty="0"/>
+              <a:t>“Shaded contours represent extent of NHC wind swaths (34 kt, 50 kt, 64 kt with increasing tone/opacity/greyness/darkness)”. </a:t>
+            </a:r>
+          </a:p>
+          <a:p>
+            <a:r>
+              <a:rPr lang="en-US" dirty="0">
+                <a:highlight>
+                  <a:srgbClr val="FFFF00"/>
+                </a:highlight>
+              </a:rPr>
+              <a:t>OR could label wind speed in italicized contour lines </a:t>
+            </a:r>
+          </a:p>
+          <a:p>
+            <a:endParaRPr lang="en-US" dirty="0"/>
+          </a:p>
+        </p:txBody>
+      </p:sp>
+      <p:sp>
+        <p:nvSpPr>
+          <p:cNvPr id="3" name="TextBox 2">
+            <a:extLst>
+              <a:ext uri="{FF2B5EF4-FFF2-40B4-BE49-F238E27FC236}">
+                <a16:creationId xmlns:a16="http://schemas.microsoft.com/office/drawing/2014/main" id="{E0F0C7D2-FC59-FA00-1075-039667057B31}"/>
+              </a:ext>
+            </a:extLst>
+          </p:cNvPr>
+          <p:cNvSpPr txBox="1"/>
+          <p:nvPr/>
+        </p:nvSpPr>
+        <p:spPr>
+          <a:xfrm>
+            <a:off x="10213728" y="7644862"/>
+            <a:ext cx="1969657" cy="461665"/>
+          </a:xfrm>
+          <a:prstGeom prst="rect">
+            <a:avLst/>
+          </a:prstGeom>
+          <a:noFill/>
+        </p:spPr>
+        <p:txBody>
+          <a:bodyPr wrap="square" rtlCol="0">
+            <a:spAutoFit/>
+          </a:bodyPr>
+          <a:lstStyle/>
+          <a:p>
+            <a:r>
+              <a:rPr lang="en-US" sz="1200" dirty="0">
+                <a:solidFill>
+                  <a:srgbClr val="FF0000"/>
+                </a:solidFill>
+                <a:highlight>
+                  <a:srgbClr val="FFFF00"/>
+                </a:highlight>
+              </a:rPr>
+              <a:t>Replace with Jenna’s</a:t>
+            </a:r>
+          </a:p>
+          <a:p>
+            <a:r>
+              <a:rPr lang="en-US" sz="1200" dirty="0">
+                <a:solidFill>
+                  <a:srgbClr val="FF0000"/>
+                </a:solidFill>
+                <a:highlight>
+                  <a:srgbClr val="FFFF00"/>
+                </a:highlight>
+              </a:rPr>
+              <a:t>legend items</a:t>
             </a:r>
           </a:p>
         </p:txBody>

</xml_diff>